<commit_message>
YMRE: New game map
</commit_message>
<xml_diff>
--- a/gamemap.pptx
+++ b/gamemap.pptx
@@ -197,7 +197,7 @@
           <a:p>
             <a:fld id="{A28436B1-9149-994B-8FD3-B7850BBE67FC}" type="datetimeFigureOut">
               <a:rPr lang="nl-NL" smtClean="0"/>
-              <a:t>20-02-2024</a:t>
+              <a:t>21-02-2024</a:t>
             </a:fld>
             <a:endParaRPr lang="nl-NL"/>
           </a:p>
@@ -2011,7 +2011,7 @@
           <a:p>
             <a:fld id="{ABEE193C-A792-D542-A610-B9755C826FD9}" type="datetimeFigureOut">
               <a:rPr lang="nl-NL" smtClean="0"/>
-              <a:t>20-02-2024</a:t>
+              <a:t>21-02-2024</a:t>
             </a:fld>
             <a:endParaRPr lang="nl-NL"/>
           </a:p>
@@ -2209,7 +2209,7 @@
           <a:p>
             <a:fld id="{ABEE193C-A792-D542-A610-B9755C826FD9}" type="datetimeFigureOut">
               <a:rPr lang="nl-NL" smtClean="0"/>
-              <a:t>20-02-2024</a:t>
+              <a:t>21-02-2024</a:t>
             </a:fld>
             <a:endParaRPr lang="nl-NL"/>
           </a:p>
@@ -2417,7 +2417,7 @@
           <a:p>
             <a:fld id="{ABEE193C-A792-D542-A610-B9755C826FD9}" type="datetimeFigureOut">
               <a:rPr lang="nl-NL" smtClean="0"/>
-              <a:t>20-02-2024</a:t>
+              <a:t>21-02-2024</a:t>
             </a:fld>
             <a:endParaRPr lang="nl-NL"/>
           </a:p>
@@ -2615,7 +2615,7 @@
           <a:p>
             <a:fld id="{ABEE193C-A792-D542-A610-B9755C826FD9}" type="datetimeFigureOut">
               <a:rPr lang="nl-NL" smtClean="0"/>
-              <a:t>20-02-2024</a:t>
+              <a:t>21-02-2024</a:t>
             </a:fld>
             <a:endParaRPr lang="nl-NL"/>
           </a:p>
@@ -2890,7 +2890,7 @@
           <a:p>
             <a:fld id="{ABEE193C-A792-D542-A610-B9755C826FD9}" type="datetimeFigureOut">
               <a:rPr lang="nl-NL" smtClean="0"/>
-              <a:t>20-02-2024</a:t>
+              <a:t>21-02-2024</a:t>
             </a:fld>
             <a:endParaRPr lang="nl-NL"/>
           </a:p>
@@ -3155,7 +3155,7 @@
           <a:p>
             <a:fld id="{ABEE193C-A792-D542-A610-B9755C826FD9}" type="datetimeFigureOut">
               <a:rPr lang="nl-NL" smtClean="0"/>
-              <a:t>20-02-2024</a:t>
+              <a:t>21-02-2024</a:t>
             </a:fld>
             <a:endParaRPr lang="nl-NL"/>
           </a:p>
@@ -3567,7 +3567,7 @@
           <a:p>
             <a:fld id="{ABEE193C-A792-D542-A610-B9755C826FD9}" type="datetimeFigureOut">
               <a:rPr lang="nl-NL" smtClean="0"/>
-              <a:t>20-02-2024</a:t>
+              <a:t>21-02-2024</a:t>
             </a:fld>
             <a:endParaRPr lang="nl-NL"/>
           </a:p>
@@ -3708,7 +3708,7 @@
           <a:p>
             <a:fld id="{ABEE193C-A792-D542-A610-B9755C826FD9}" type="datetimeFigureOut">
               <a:rPr lang="nl-NL" smtClean="0"/>
-              <a:t>20-02-2024</a:t>
+              <a:t>21-02-2024</a:t>
             </a:fld>
             <a:endParaRPr lang="nl-NL"/>
           </a:p>
@@ -3821,7 +3821,7 @@
           <a:p>
             <a:fld id="{ABEE193C-A792-D542-A610-B9755C826FD9}" type="datetimeFigureOut">
               <a:rPr lang="nl-NL" smtClean="0"/>
-              <a:t>20-02-2024</a:t>
+              <a:t>21-02-2024</a:t>
             </a:fld>
             <a:endParaRPr lang="nl-NL"/>
           </a:p>
@@ -4132,7 +4132,7 @@
           <a:p>
             <a:fld id="{ABEE193C-A792-D542-A610-B9755C826FD9}" type="datetimeFigureOut">
               <a:rPr lang="nl-NL" smtClean="0"/>
-              <a:t>20-02-2024</a:t>
+              <a:t>21-02-2024</a:t>
             </a:fld>
             <a:endParaRPr lang="nl-NL"/>
           </a:p>
@@ -4420,7 +4420,7 @@
           <a:p>
             <a:fld id="{ABEE193C-A792-D542-A610-B9755C826FD9}" type="datetimeFigureOut">
               <a:rPr lang="nl-NL" smtClean="0"/>
-              <a:t>20-02-2024</a:t>
+              <a:t>21-02-2024</a:t>
             </a:fld>
             <a:endParaRPr lang="nl-NL"/>
           </a:p>
@@ -4661,7 +4661,7 @@
           <a:p>
             <a:fld id="{ABEE193C-A792-D542-A610-B9755C826FD9}" type="datetimeFigureOut">
               <a:rPr lang="nl-NL" smtClean="0"/>
-              <a:t>20-02-2024</a:t>
+              <a:t>21-02-2024</a:t>
             </a:fld>
             <a:endParaRPr lang="nl-NL"/>
           </a:p>
@@ -5110,6 +5110,706 @@
       </p:pic>
       <p:sp>
         <p:nvSpPr>
+          <p:cNvPr id="3" name="Vrije vorm 2">
+            <a:extLst>
+              <a:ext uri="{FF2B5EF4-FFF2-40B4-BE49-F238E27FC236}">
+                <a16:creationId xmlns:a16="http://schemas.microsoft.com/office/drawing/2014/main" id="{66CD8324-D2D9-BD3D-443B-93B81D4A8995}"/>
+              </a:ext>
+            </a:extLst>
+          </p:cNvPr>
+          <p:cNvSpPr/>
+          <p:nvPr/>
+        </p:nvSpPr>
+        <p:spPr>
+          <a:xfrm>
+            <a:off x="3630997" y="2235785"/>
+            <a:ext cx="7474005" cy="4297218"/>
+          </a:xfrm>
+          <a:custGeom>
+            <a:avLst/>
+            <a:gdLst>
+              <a:gd name="connsiteX0" fmla="*/ 7474005 w 7474005"/>
+              <a:gd name="connsiteY0" fmla="*/ 4286201 h 4297218"/>
+              <a:gd name="connsiteX1" fmla="*/ 6647740 w 7474005"/>
+              <a:gd name="connsiteY1" fmla="*/ 4275184 h 4297218"/>
+              <a:gd name="connsiteX2" fmla="*/ 6273167 w 7474005"/>
+              <a:gd name="connsiteY2" fmla="*/ 4087897 h 4297218"/>
+              <a:gd name="connsiteX3" fmla="*/ 6052830 w 7474005"/>
+              <a:gd name="connsiteY3" fmla="*/ 3845526 h 4297218"/>
+              <a:gd name="connsiteX4" fmla="*/ 6030796 w 7474005"/>
+              <a:gd name="connsiteY4" fmla="*/ 3603155 h 4297218"/>
+              <a:gd name="connsiteX5" fmla="*/ 5678256 w 7474005"/>
+              <a:gd name="connsiteY5" fmla="*/ 3437902 h 4297218"/>
+              <a:gd name="connsiteX6" fmla="*/ 5391817 w 7474005"/>
+              <a:gd name="connsiteY6" fmla="*/ 3305699 h 4297218"/>
+              <a:gd name="connsiteX7" fmla="*/ 5700290 w 7474005"/>
+              <a:gd name="connsiteY7" fmla="*/ 3173497 h 4297218"/>
+              <a:gd name="connsiteX8" fmla="*/ 5931644 w 7474005"/>
+              <a:gd name="connsiteY8" fmla="*/ 3019261 h 4297218"/>
+              <a:gd name="connsiteX9" fmla="*/ 5524020 w 7474005"/>
+              <a:gd name="connsiteY9" fmla="*/ 2876042 h 4297218"/>
+              <a:gd name="connsiteX10" fmla="*/ 5656222 w 7474005"/>
+              <a:gd name="connsiteY10" fmla="*/ 2688755 h 4297218"/>
+              <a:gd name="connsiteX11" fmla="*/ 5171480 w 7474005"/>
+              <a:gd name="connsiteY11" fmla="*/ 2556552 h 4297218"/>
+              <a:gd name="connsiteX12" fmla="*/ 5248598 w 7474005"/>
+              <a:gd name="connsiteY12" fmla="*/ 2325198 h 4297218"/>
+              <a:gd name="connsiteX13" fmla="*/ 4785890 w 7474005"/>
+              <a:gd name="connsiteY13" fmla="*/ 2369266 h 4297218"/>
+              <a:gd name="connsiteX14" fmla="*/ 4774873 w 7474005"/>
+              <a:gd name="connsiteY14" fmla="*/ 2126895 h 4297218"/>
+              <a:gd name="connsiteX15" fmla="*/ 4323181 w 7474005"/>
+              <a:gd name="connsiteY15" fmla="*/ 2005709 h 4297218"/>
+              <a:gd name="connsiteX16" fmla="*/ 4124878 w 7474005"/>
+              <a:gd name="connsiteY16" fmla="*/ 2192996 h 4297218"/>
+              <a:gd name="connsiteX17" fmla="*/ 3860473 w 7474005"/>
+              <a:gd name="connsiteY17" fmla="*/ 2391299 h 4297218"/>
+              <a:gd name="connsiteX18" fmla="*/ 3452849 w 7474005"/>
+              <a:gd name="connsiteY18" fmla="*/ 2281131 h 4297218"/>
+              <a:gd name="connsiteX19" fmla="*/ 3353697 w 7474005"/>
+              <a:gd name="connsiteY19" fmla="*/ 2071810 h 4297218"/>
+              <a:gd name="connsiteX20" fmla="*/ 3342680 w 7474005"/>
+              <a:gd name="connsiteY20" fmla="*/ 1851473 h 4297218"/>
+              <a:gd name="connsiteX21" fmla="*/ 3287596 w 7474005"/>
+              <a:gd name="connsiteY21" fmla="*/ 1642152 h 4297218"/>
+              <a:gd name="connsiteX22" fmla="*/ 3397764 w 7474005"/>
+              <a:gd name="connsiteY22" fmla="*/ 1465882 h 4297218"/>
+              <a:gd name="connsiteX23" fmla="*/ 3651152 w 7474005"/>
+              <a:gd name="connsiteY23" fmla="*/ 1289613 h 4297218"/>
+              <a:gd name="connsiteX24" fmla="*/ 3287596 w 7474005"/>
+              <a:gd name="connsiteY24" fmla="*/ 1212495 h 4297218"/>
+              <a:gd name="connsiteX25" fmla="*/ 2968107 w 7474005"/>
+              <a:gd name="connsiteY25" fmla="*/ 1366731 h 4297218"/>
+              <a:gd name="connsiteX26" fmla="*/ 2692685 w 7474005"/>
+              <a:gd name="connsiteY26" fmla="*/ 1531984 h 4297218"/>
+              <a:gd name="connsiteX27" fmla="*/ 2670651 w 7474005"/>
+              <a:gd name="connsiteY27" fmla="*/ 1741304 h 4297218"/>
+              <a:gd name="connsiteX28" fmla="*/ 2791837 w 7474005"/>
+              <a:gd name="connsiteY28" fmla="*/ 2005709 h 4297218"/>
+              <a:gd name="connsiteX29" fmla="*/ 2615567 w 7474005"/>
+              <a:gd name="connsiteY29" fmla="*/ 2237063 h 4297218"/>
+              <a:gd name="connsiteX30" fmla="*/ 2086757 w 7474005"/>
+              <a:gd name="connsiteY30" fmla="*/ 2093844 h 4297218"/>
+              <a:gd name="connsiteX31" fmla="*/ 1701167 w 7474005"/>
+              <a:gd name="connsiteY31" fmla="*/ 2137911 h 4297218"/>
+              <a:gd name="connsiteX32" fmla="*/ 1668116 w 7474005"/>
+              <a:gd name="connsiteY32" fmla="*/ 1928591 h 4297218"/>
+              <a:gd name="connsiteX33" fmla="*/ 1282526 w 7474005"/>
+              <a:gd name="connsiteY33" fmla="*/ 1807405 h 4297218"/>
+              <a:gd name="connsiteX34" fmla="*/ 1370661 w 7474005"/>
+              <a:gd name="connsiteY34" fmla="*/ 1620119 h 4297218"/>
+              <a:gd name="connsiteX35" fmla="*/ 1304560 w 7474005"/>
+              <a:gd name="connsiteY35" fmla="*/ 1399781 h 4297218"/>
+              <a:gd name="connsiteX36" fmla="*/ 963037 w 7474005"/>
+              <a:gd name="connsiteY36" fmla="*/ 1565034 h 4297218"/>
+              <a:gd name="connsiteX37" fmla="*/ 500328 w 7474005"/>
+              <a:gd name="connsiteY37" fmla="*/ 1509950 h 4297218"/>
+              <a:gd name="connsiteX38" fmla="*/ 15586 w 7474005"/>
+              <a:gd name="connsiteY38" fmla="*/ 1476899 h 4297218"/>
+              <a:gd name="connsiteX39" fmla="*/ 136772 w 7474005"/>
+              <a:gd name="connsiteY39" fmla="*/ 1256562 h 4297218"/>
+              <a:gd name="connsiteX40" fmla="*/ 313042 w 7474005"/>
+              <a:gd name="connsiteY40" fmla="*/ 1014191 h 4297218"/>
+              <a:gd name="connsiteX41" fmla="*/ 852868 w 7474005"/>
+              <a:gd name="connsiteY41" fmla="*/ 1069275 h 4297218"/>
+              <a:gd name="connsiteX42" fmla="*/ 1282526 w 7474005"/>
+              <a:gd name="connsiteY42" fmla="*/ 1047242 h 4297218"/>
+              <a:gd name="connsiteX43" fmla="*/ 1701167 w 7474005"/>
+              <a:gd name="connsiteY43" fmla="*/ 1157410 h 4297218"/>
+              <a:gd name="connsiteX44" fmla="*/ 2152858 w 7474005"/>
+              <a:gd name="connsiteY44" fmla="*/ 1168427 h 4297218"/>
+              <a:gd name="connsiteX45" fmla="*/ 2604550 w 7474005"/>
+              <a:gd name="connsiteY45" fmla="*/ 1146393 h 4297218"/>
+              <a:gd name="connsiteX46" fmla="*/ 2924039 w 7474005"/>
+              <a:gd name="connsiteY46" fmla="*/ 981140 h 4297218"/>
+              <a:gd name="connsiteX47" fmla="*/ 3221495 w 7474005"/>
+              <a:gd name="connsiteY47" fmla="*/ 826904 h 4297218"/>
+              <a:gd name="connsiteX48" fmla="*/ 3353697 w 7474005"/>
+              <a:gd name="connsiteY48" fmla="*/ 606567 h 4297218"/>
+              <a:gd name="connsiteX49" fmla="*/ 3342680 w 7474005"/>
+              <a:gd name="connsiteY49" fmla="*/ 353179 h 4297218"/>
+              <a:gd name="connsiteX50" fmla="*/ 2868955 w 7474005"/>
+              <a:gd name="connsiteY50" fmla="*/ 408263 h 4297218"/>
+              <a:gd name="connsiteX51" fmla="*/ 2957090 w 7474005"/>
+              <a:gd name="connsiteY51" fmla="*/ 198943 h 4297218"/>
+              <a:gd name="connsiteX52" fmla="*/ 2681668 w 7474005"/>
+              <a:gd name="connsiteY52" fmla="*/ 639 h 4297218"/>
+              <a:gd name="connsiteX53" fmla="*/ 2340145 w 7474005"/>
+              <a:gd name="connsiteY53" fmla="*/ 143858 h 4297218"/>
+              <a:gd name="connsiteX54" fmla="*/ 2307095 w 7474005"/>
+              <a:gd name="connsiteY54" fmla="*/ 364196 h 4297218"/>
+              <a:gd name="connsiteX55" fmla="*/ 2218960 w 7474005"/>
+              <a:gd name="connsiteY55" fmla="*/ 562499 h 4297218"/>
+              <a:gd name="connsiteX56" fmla="*/ 2163875 w 7474005"/>
+              <a:gd name="connsiteY56" fmla="*/ 760803 h 4297218"/>
+              <a:gd name="connsiteX57" fmla="*/ 1745234 w 7474005"/>
+              <a:gd name="connsiteY57" fmla="*/ 815887 h 4297218"/>
+              <a:gd name="connsiteX58" fmla="*/ 1690150 w 7474005"/>
+              <a:gd name="connsiteY58" fmla="*/ 595550 h 4297218"/>
+              <a:gd name="connsiteX59" fmla="*/ 1734217 w 7474005"/>
+              <a:gd name="connsiteY59" fmla="*/ 331145 h 4297218"/>
+              <a:gd name="connsiteX60" fmla="*/ 1403711 w 7474005"/>
+              <a:gd name="connsiteY60" fmla="*/ 198943 h 4297218"/>
+              <a:gd name="connsiteX61" fmla="*/ 1282526 w 7474005"/>
+              <a:gd name="connsiteY61" fmla="*/ 452331 h 4297218"/>
+              <a:gd name="connsiteX62" fmla="*/ 985070 w 7474005"/>
+              <a:gd name="connsiteY62" fmla="*/ 518432 h 4297218"/>
+              <a:gd name="connsiteX63" fmla="*/ 500328 w 7474005"/>
+              <a:gd name="connsiteY63" fmla="*/ 474364 h 4297218"/>
+            </a:gdLst>
+            <a:ahLst/>
+            <a:cxnLst>
+              <a:cxn ang="0">
+                <a:pos x="connsiteX0" y="connsiteY0"/>
+              </a:cxn>
+              <a:cxn ang="0">
+                <a:pos x="connsiteX1" y="connsiteY1"/>
+              </a:cxn>
+              <a:cxn ang="0">
+                <a:pos x="connsiteX2" y="connsiteY2"/>
+              </a:cxn>
+              <a:cxn ang="0">
+                <a:pos x="connsiteX3" y="connsiteY3"/>
+              </a:cxn>
+              <a:cxn ang="0">
+                <a:pos x="connsiteX4" y="connsiteY4"/>
+              </a:cxn>
+              <a:cxn ang="0">
+                <a:pos x="connsiteX5" y="connsiteY5"/>
+              </a:cxn>
+              <a:cxn ang="0">
+                <a:pos x="connsiteX6" y="connsiteY6"/>
+              </a:cxn>
+              <a:cxn ang="0">
+                <a:pos x="connsiteX7" y="connsiteY7"/>
+              </a:cxn>
+              <a:cxn ang="0">
+                <a:pos x="connsiteX8" y="connsiteY8"/>
+              </a:cxn>
+              <a:cxn ang="0">
+                <a:pos x="connsiteX9" y="connsiteY9"/>
+              </a:cxn>
+              <a:cxn ang="0">
+                <a:pos x="connsiteX10" y="connsiteY10"/>
+              </a:cxn>
+              <a:cxn ang="0">
+                <a:pos x="connsiteX11" y="connsiteY11"/>
+              </a:cxn>
+              <a:cxn ang="0">
+                <a:pos x="connsiteX12" y="connsiteY12"/>
+              </a:cxn>
+              <a:cxn ang="0">
+                <a:pos x="connsiteX13" y="connsiteY13"/>
+              </a:cxn>
+              <a:cxn ang="0">
+                <a:pos x="connsiteX14" y="connsiteY14"/>
+              </a:cxn>
+              <a:cxn ang="0">
+                <a:pos x="connsiteX15" y="connsiteY15"/>
+              </a:cxn>
+              <a:cxn ang="0">
+                <a:pos x="connsiteX16" y="connsiteY16"/>
+              </a:cxn>
+              <a:cxn ang="0">
+                <a:pos x="connsiteX17" y="connsiteY17"/>
+              </a:cxn>
+              <a:cxn ang="0">
+                <a:pos x="connsiteX18" y="connsiteY18"/>
+              </a:cxn>
+              <a:cxn ang="0">
+                <a:pos x="connsiteX19" y="connsiteY19"/>
+              </a:cxn>
+              <a:cxn ang="0">
+                <a:pos x="connsiteX20" y="connsiteY20"/>
+              </a:cxn>
+              <a:cxn ang="0">
+                <a:pos x="connsiteX21" y="connsiteY21"/>
+              </a:cxn>
+              <a:cxn ang="0">
+                <a:pos x="connsiteX22" y="connsiteY22"/>
+              </a:cxn>
+              <a:cxn ang="0">
+                <a:pos x="connsiteX23" y="connsiteY23"/>
+              </a:cxn>
+              <a:cxn ang="0">
+                <a:pos x="connsiteX24" y="connsiteY24"/>
+              </a:cxn>
+              <a:cxn ang="0">
+                <a:pos x="connsiteX25" y="connsiteY25"/>
+              </a:cxn>
+              <a:cxn ang="0">
+                <a:pos x="connsiteX26" y="connsiteY26"/>
+              </a:cxn>
+              <a:cxn ang="0">
+                <a:pos x="connsiteX27" y="connsiteY27"/>
+              </a:cxn>
+              <a:cxn ang="0">
+                <a:pos x="connsiteX28" y="connsiteY28"/>
+              </a:cxn>
+              <a:cxn ang="0">
+                <a:pos x="connsiteX29" y="connsiteY29"/>
+              </a:cxn>
+              <a:cxn ang="0">
+                <a:pos x="connsiteX30" y="connsiteY30"/>
+              </a:cxn>
+              <a:cxn ang="0">
+                <a:pos x="connsiteX31" y="connsiteY31"/>
+              </a:cxn>
+              <a:cxn ang="0">
+                <a:pos x="connsiteX32" y="connsiteY32"/>
+              </a:cxn>
+              <a:cxn ang="0">
+                <a:pos x="connsiteX33" y="connsiteY33"/>
+              </a:cxn>
+              <a:cxn ang="0">
+                <a:pos x="connsiteX34" y="connsiteY34"/>
+              </a:cxn>
+              <a:cxn ang="0">
+                <a:pos x="connsiteX35" y="connsiteY35"/>
+              </a:cxn>
+              <a:cxn ang="0">
+                <a:pos x="connsiteX36" y="connsiteY36"/>
+              </a:cxn>
+              <a:cxn ang="0">
+                <a:pos x="connsiteX37" y="connsiteY37"/>
+              </a:cxn>
+              <a:cxn ang="0">
+                <a:pos x="connsiteX38" y="connsiteY38"/>
+              </a:cxn>
+              <a:cxn ang="0">
+                <a:pos x="connsiteX39" y="connsiteY39"/>
+              </a:cxn>
+              <a:cxn ang="0">
+                <a:pos x="connsiteX40" y="connsiteY40"/>
+              </a:cxn>
+              <a:cxn ang="0">
+                <a:pos x="connsiteX41" y="connsiteY41"/>
+              </a:cxn>
+              <a:cxn ang="0">
+                <a:pos x="connsiteX42" y="connsiteY42"/>
+              </a:cxn>
+              <a:cxn ang="0">
+                <a:pos x="connsiteX43" y="connsiteY43"/>
+              </a:cxn>
+              <a:cxn ang="0">
+                <a:pos x="connsiteX44" y="connsiteY44"/>
+              </a:cxn>
+              <a:cxn ang="0">
+                <a:pos x="connsiteX45" y="connsiteY45"/>
+              </a:cxn>
+              <a:cxn ang="0">
+                <a:pos x="connsiteX46" y="connsiteY46"/>
+              </a:cxn>
+              <a:cxn ang="0">
+                <a:pos x="connsiteX47" y="connsiteY47"/>
+              </a:cxn>
+              <a:cxn ang="0">
+                <a:pos x="connsiteX48" y="connsiteY48"/>
+              </a:cxn>
+              <a:cxn ang="0">
+                <a:pos x="connsiteX49" y="connsiteY49"/>
+              </a:cxn>
+              <a:cxn ang="0">
+                <a:pos x="connsiteX50" y="connsiteY50"/>
+              </a:cxn>
+              <a:cxn ang="0">
+                <a:pos x="connsiteX51" y="connsiteY51"/>
+              </a:cxn>
+              <a:cxn ang="0">
+                <a:pos x="connsiteX52" y="connsiteY52"/>
+              </a:cxn>
+              <a:cxn ang="0">
+                <a:pos x="connsiteX53" y="connsiteY53"/>
+              </a:cxn>
+              <a:cxn ang="0">
+                <a:pos x="connsiteX54" y="connsiteY54"/>
+              </a:cxn>
+              <a:cxn ang="0">
+                <a:pos x="connsiteX55" y="connsiteY55"/>
+              </a:cxn>
+              <a:cxn ang="0">
+                <a:pos x="connsiteX56" y="connsiteY56"/>
+              </a:cxn>
+              <a:cxn ang="0">
+                <a:pos x="connsiteX57" y="connsiteY57"/>
+              </a:cxn>
+              <a:cxn ang="0">
+                <a:pos x="connsiteX58" y="connsiteY58"/>
+              </a:cxn>
+              <a:cxn ang="0">
+                <a:pos x="connsiteX59" y="connsiteY59"/>
+              </a:cxn>
+              <a:cxn ang="0">
+                <a:pos x="connsiteX60" y="connsiteY60"/>
+              </a:cxn>
+              <a:cxn ang="0">
+                <a:pos x="connsiteX61" y="connsiteY61"/>
+              </a:cxn>
+              <a:cxn ang="0">
+                <a:pos x="connsiteX62" y="connsiteY62"/>
+              </a:cxn>
+              <a:cxn ang="0">
+                <a:pos x="connsiteX63" y="connsiteY63"/>
+              </a:cxn>
+            </a:cxnLst>
+            <a:rect l="l" t="t" r="r" b="b"/>
+            <a:pathLst>
+              <a:path w="7474005" h="4297218">
+                <a:moveTo>
+                  <a:pt x="7474005" y="4286201"/>
+                </a:moveTo>
+                <a:cubicBezTo>
+                  <a:pt x="7160942" y="4297218"/>
+                  <a:pt x="6847880" y="4308235"/>
+                  <a:pt x="6647740" y="4275184"/>
+                </a:cubicBezTo>
+                <a:cubicBezTo>
+                  <a:pt x="6447600" y="4242133"/>
+                  <a:pt x="6372319" y="4159507"/>
+                  <a:pt x="6273167" y="4087897"/>
+                </a:cubicBezTo>
+                <a:cubicBezTo>
+                  <a:pt x="6174015" y="4016287"/>
+                  <a:pt x="6093225" y="3926316"/>
+                  <a:pt x="6052830" y="3845526"/>
+                </a:cubicBezTo>
+                <a:cubicBezTo>
+                  <a:pt x="6012435" y="3764736"/>
+                  <a:pt x="6093225" y="3671092"/>
+                  <a:pt x="6030796" y="3603155"/>
+                </a:cubicBezTo>
+                <a:cubicBezTo>
+                  <a:pt x="5968367" y="3535218"/>
+                  <a:pt x="5678256" y="3437902"/>
+                  <a:pt x="5678256" y="3437902"/>
+                </a:cubicBezTo>
+                <a:cubicBezTo>
+                  <a:pt x="5571760" y="3388326"/>
+                  <a:pt x="5388145" y="3349766"/>
+                  <a:pt x="5391817" y="3305699"/>
+                </a:cubicBezTo>
+                <a:cubicBezTo>
+                  <a:pt x="5395489" y="3261632"/>
+                  <a:pt x="5610319" y="3221237"/>
+                  <a:pt x="5700290" y="3173497"/>
+                </a:cubicBezTo>
+                <a:cubicBezTo>
+                  <a:pt x="5790261" y="3125757"/>
+                  <a:pt x="5961022" y="3068837"/>
+                  <a:pt x="5931644" y="3019261"/>
+                </a:cubicBezTo>
+                <a:cubicBezTo>
+                  <a:pt x="5902266" y="2969685"/>
+                  <a:pt x="5569924" y="2931126"/>
+                  <a:pt x="5524020" y="2876042"/>
+                </a:cubicBezTo>
+                <a:cubicBezTo>
+                  <a:pt x="5478116" y="2820958"/>
+                  <a:pt x="5714979" y="2742003"/>
+                  <a:pt x="5656222" y="2688755"/>
+                </a:cubicBezTo>
+                <a:cubicBezTo>
+                  <a:pt x="5597465" y="2635507"/>
+                  <a:pt x="5239417" y="2617145"/>
+                  <a:pt x="5171480" y="2556552"/>
+                </a:cubicBezTo>
+                <a:cubicBezTo>
+                  <a:pt x="5103543" y="2495959"/>
+                  <a:pt x="5312863" y="2356412"/>
+                  <a:pt x="5248598" y="2325198"/>
+                </a:cubicBezTo>
+                <a:cubicBezTo>
+                  <a:pt x="5184333" y="2293984"/>
+                  <a:pt x="4864844" y="2402316"/>
+                  <a:pt x="4785890" y="2369266"/>
+                </a:cubicBezTo>
+                <a:cubicBezTo>
+                  <a:pt x="4706936" y="2336216"/>
+                  <a:pt x="4851991" y="2187488"/>
+                  <a:pt x="4774873" y="2126895"/>
+                </a:cubicBezTo>
+                <a:cubicBezTo>
+                  <a:pt x="4697755" y="2066302"/>
+                  <a:pt x="4431513" y="1994692"/>
+                  <a:pt x="4323181" y="2005709"/>
+                </a:cubicBezTo>
+                <a:cubicBezTo>
+                  <a:pt x="4214848" y="2016726"/>
+                  <a:pt x="4201996" y="2128731"/>
+                  <a:pt x="4124878" y="2192996"/>
+                </a:cubicBezTo>
+                <a:cubicBezTo>
+                  <a:pt x="4047760" y="2257261"/>
+                  <a:pt x="3972478" y="2376610"/>
+                  <a:pt x="3860473" y="2391299"/>
+                </a:cubicBezTo>
+                <a:cubicBezTo>
+                  <a:pt x="3748468" y="2405988"/>
+                  <a:pt x="3537312" y="2334379"/>
+                  <a:pt x="3452849" y="2281131"/>
+                </a:cubicBezTo>
+                <a:cubicBezTo>
+                  <a:pt x="3368386" y="2227883"/>
+                  <a:pt x="3372058" y="2143420"/>
+                  <a:pt x="3353697" y="2071810"/>
+                </a:cubicBezTo>
+                <a:cubicBezTo>
+                  <a:pt x="3335335" y="2000200"/>
+                  <a:pt x="3353697" y="1923083"/>
+                  <a:pt x="3342680" y="1851473"/>
+                </a:cubicBezTo>
+                <a:cubicBezTo>
+                  <a:pt x="3331663" y="1779863"/>
+                  <a:pt x="3278415" y="1706417"/>
+                  <a:pt x="3287596" y="1642152"/>
+                </a:cubicBezTo>
+                <a:cubicBezTo>
+                  <a:pt x="3296777" y="1577887"/>
+                  <a:pt x="3337171" y="1524638"/>
+                  <a:pt x="3397764" y="1465882"/>
+                </a:cubicBezTo>
+                <a:cubicBezTo>
+                  <a:pt x="3458357" y="1407126"/>
+                  <a:pt x="3669513" y="1331844"/>
+                  <a:pt x="3651152" y="1289613"/>
+                </a:cubicBezTo>
+                <a:cubicBezTo>
+                  <a:pt x="3632791" y="1247382"/>
+                  <a:pt x="3401437" y="1199642"/>
+                  <a:pt x="3287596" y="1212495"/>
+                </a:cubicBezTo>
+                <a:cubicBezTo>
+                  <a:pt x="3173755" y="1225348"/>
+                  <a:pt x="3067259" y="1313483"/>
+                  <a:pt x="2968107" y="1366731"/>
+                </a:cubicBezTo>
+                <a:cubicBezTo>
+                  <a:pt x="2868955" y="1419979"/>
+                  <a:pt x="2742261" y="1469555"/>
+                  <a:pt x="2692685" y="1531984"/>
+                </a:cubicBezTo>
+                <a:cubicBezTo>
+                  <a:pt x="2643109" y="1594413"/>
+                  <a:pt x="2654126" y="1662350"/>
+                  <a:pt x="2670651" y="1741304"/>
+                </a:cubicBezTo>
+                <a:cubicBezTo>
+                  <a:pt x="2687176" y="1820258"/>
+                  <a:pt x="2801018" y="1923083"/>
+                  <a:pt x="2791837" y="2005709"/>
+                </a:cubicBezTo>
+                <a:cubicBezTo>
+                  <a:pt x="2782656" y="2088335"/>
+                  <a:pt x="2733080" y="2222374"/>
+                  <a:pt x="2615567" y="2237063"/>
+                </a:cubicBezTo>
+                <a:cubicBezTo>
+                  <a:pt x="2498054" y="2251752"/>
+                  <a:pt x="2239157" y="2110369"/>
+                  <a:pt x="2086757" y="2093844"/>
+                </a:cubicBezTo>
+                <a:cubicBezTo>
+                  <a:pt x="1934357" y="2077319"/>
+                  <a:pt x="1770940" y="2165453"/>
+                  <a:pt x="1701167" y="2137911"/>
+                </a:cubicBezTo>
+                <a:cubicBezTo>
+                  <a:pt x="1631394" y="2110369"/>
+                  <a:pt x="1737889" y="1983675"/>
+                  <a:pt x="1668116" y="1928591"/>
+                </a:cubicBezTo>
+                <a:cubicBezTo>
+                  <a:pt x="1598342" y="1873507"/>
+                  <a:pt x="1332102" y="1858817"/>
+                  <a:pt x="1282526" y="1807405"/>
+                </a:cubicBezTo>
+                <a:cubicBezTo>
+                  <a:pt x="1232950" y="1755993"/>
+                  <a:pt x="1366989" y="1688056"/>
+                  <a:pt x="1370661" y="1620119"/>
+                </a:cubicBezTo>
+                <a:cubicBezTo>
+                  <a:pt x="1374333" y="1552182"/>
+                  <a:pt x="1372497" y="1408962"/>
+                  <a:pt x="1304560" y="1399781"/>
+                </a:cubicBezTo>
+                <a:cubicBezTo>
+                  <a:pt x="1236623" y="1390600"/>
+                  <a:pt x="1097076" y="1546672"/>
+                  <a:pt x="963037" y="1565034"/>
+                </a:cubicBezTo>
+                <a:cubicBezTo>
+                  <a:pt x="828998" y="1583395"/>
+                  <a:pt x="658236" y="1524639"/>
+                  <a:pt x="500328" y="1509950"/>
+                </a:cubicBezTo>
+                <a:cubicBezTo>
+                  <a:pt x="342420" y="1495261"/>
+                  <a:pt x="76179" y="1519130"/>
+                  <a:pt x="15586" y="1476899"/>
+                </a:cubicBezTo>
+                <a:cubicBezTo>
+                  <a:pt x="-45007" y="1434668"/>
+                  <a:pt x="87196" y="1333680"/>
+                  <a:pt x="136772" y="1256562"/>
+                </a:cubicBezTo>
+                <a:cubicBezTo>
+                  <a:pt x="186348" y="1179444"/>
+                  <a:pt x="193693" y="1045405"/>
+                  <a:pt x="313042" y="1014191"/>
+                </a:cubicBezTo>
+                <a:cubicBezTo>
+                  <a:pt x="432391" y="982977"/>
+                  <a:pt x="691287" y="1063767"/>
+                  <a:pt x="852868" y="1069275"/>
+                </a:cubicBezTo>
+                <a:cubicBezTo>
+                  <a:pt x="1014449" y="1074783"/>
+                  <a:pt x="1141143" y="1032553"/>
+                  <a:pt x="1282526" y="1047242"/>
+                </a:cubicBezTo>
+                <a:cubicBezTo>
+                  <a:pt x="1423909" y="1061931"/>
+                  <a:pt x="1556112" y="1137213"/>
+                  <a:pt x="1701167" y="1157410"/>
+                </a:cubicBezTo>
+                <a:cubicBezTo>
+                  <a:pt x="1846222" y="1177607"/>
+                  <a:pt x="2002294" y="1170263"/>
+                  <a:pt x="2152858" y="1168427"/>
+                </a:cubicBezTo>
+                <a:cubicBezTo>
+                  <a:pt x="2303422" y="1166591"/>
+                  <a:pt x="2476020" y="1177607"/>
+                  <a:pt x="2604550" y="1146393"/>
+                </a:cubicBezTo>
+                <a:cubicBezTo>
+                  <a:pt x="2733080" y="1115179"/>
+                  <a:pt x="2924039" y="981140"/>
+                  <a:pt x="2924039" y="981140"/>
+                </a:cubicBezTo>
+                <a:cubicBezTo>
+                  <a:pt x="3026863" y="927892"/>
+                  <a:pt x="3149885" y="889333"/>
+                  <a:pt x="3221495" y="826904"/>
+                </a:cubicBezTo>
+                <a:cubicBezTo>
+                  <a:pt x="3293105" y="764475"/>
+                  <a:pt x="3333500" y="685521"/>
+                  <a:pt x="3353697" y="606567"/>
+                </a:cubicBezTo>
+                <a:cubicBezTo>
+                  <a:pt x="3373894" y="527613"/>
+                  <a:pt x="3423470" y="386230"/>
+                  <a:pt x="3342680" y="353179"/>
+                </a:cubicBezTo>
+                <a:cubicBezTo>
+                  <a:pt x="3261890" y="320128"/>
+                  <a:pt x="2933220" y="433969"/>
+                  <a:pt x="2868955" y="408263"/>
+                </a:cubicBezTo>
+                <a:cubicBezTo>
+                  <a:pt x="2804690" y="382557"/>
+                  <a:pt x="2988304" y="266880"/>
+                  <a:pt x="2957090" y="198943"/>
+                </a:cubicBezTo>
+                <a:cubicBezTo>
+                  <a:pt x="2925876" y="131006"/>
+                  <a:pt x="2784492" y="9820"/>
+                  <a:pt x="2681668" y="639"/>
+                </a:cubicBezTo>
+                <a:cubicBezTo>
+                  <a:pt x="2578844" y="-8542"/>
+                  <a:pt x="2402574" y="83265"/>
+                  <a:pt x="2340145" y="143858"/>
+                </a:cubicBezTo>
+                <a:cubicBezTo>
+                  <a:pt x="2277716" y="204451"/>
+                  <a:pt x="2327292" y="294423"/>
+                  <a:pt x="2307095" y="364196"/>
+                </a:cubicBezTo>
+                <a:cubicBezTo>
+                  <a:pt x="2286898" y="433969"/>
+                  <a:pt x="2242830" y="496398"/>
+                  <a:pt x="2218960" y="562499"/>
+                </a:cubicBezTo>
+                <a:cubicBezTo>
+                  <a:pt x="2195090" y="628600"/>
+                  <a:pt x="2242829" y="718572"/>
+                  <a:pt x="2163875" y="760803"/>
+                </a:cubicBezTo>
+                <a:cubicBezTo>
+                  <a:pt x="2084921" y="803034"/>
+                  <a:pt x="1824188" y="843429"/>
+                  <a:pt x="1745234" y="815887"/>
+                </a:cubicBezTo>
+                <a:cubicBezTo>
+                  <a:pt x="1666280" y="788345"/>
+                  <a:pt x="1691986" y="676340"/>
+                  <a:pt x="1690150" y="595550"/>
+                </a:cubicBezTo>
+                <a:cubicBezTo>
+                  <a:pt x="1688314" y="514760"/>
+                  <a:pt x="1781957" y="397246"/>
+                  <a:pt x="1734217" y="331145"/>
+                </a:cubicBezTo>
+                <a:cubicBezTo>
+                  <a:pt x="1686477" y="265044"/>
+                  <a:pt x="1478993" y="178745"/>
+                  <a:pt x="1403711" y="198943"/>
+                </a:cubicBezTo>
+                <a:cubicBezTo>
+                  <a:pt x="1328429" y="219141"/>
+                  <a:pt x="1352299" y="399083"/>
+                  <a:pt x="1282526" y="452331"/>
+                </a:cubicBezTo>
+                <a:cubicBezTo>
+                  <a:pt x="1212752" y="505579"/>
+                  <a:pt x="1115436" y="514760"/>
+                  <a:pt x="985070" y="518432"/>
+                </a:cubicBezTo>
+                <a:cubicBezTo>
+                  <a:pt x="854704" y="522104"/>
+                  <a:pt x="677516" y="498234"/>
+                  <a:pt x="500328" y="474364"/>
+                </a:cubicBezTo>
+              </a:path>
+            </a:pathLst>
+          </a:custGeom>
+          <a:noFill/>
+          <a:ln w="57150">
+            <a:solidFill>
+              <a:srgbClr val="FF0000"/>
+            </a:solidFill>
+          </a:ln>
+        </p:spPr>
+        <p:style>
+          <a:lnRef idx="2">
+            <a:schemeClr val="accent1">
+              <a:shade val="15000"/>
+            </a:schemeClr>
+          </a:lnRef>
+          <a:fillRef idx="1">
+            <a:schemeClr val="accent1"/>
+          </a:fillRef>
+          <a:effectRef idx="0">
+            <a:schemeClr val="accent1"/>
+          </a:effectRef>
+          <a:fontRef idx="minor">
+            <a:schemeClr val="lt1"/>
+          </a:fontRef>
+        </p:style>
+        <p:txBody>
+          <a:bodyPr rtlCol="0" anchor="ctr"/>
+          <a:lstStyle/>
+          <a:p>
+            <a:pPr algn="ctr"/>
+            <a:endParaRPr lang="nl-NL"/>
+          </a:p>
+        </p:txBody>
+      </p:sp>
+      <p:sp>
+        <p:nvSpPr>
           <p:cNvPr id="6" name="Ovaal 5">
             <a:extLst>
               <a:ext uri="{FF2B5EF4-FFF2-40B4-BE49-F238E27FC236}">
@@ -5760,6 +6460,64 @@
             <a:avLst/>
           </a:prstGeom>
           <a:solidFill>
+            <a:schemeClr val="accent4"/>
+          </a:solidFill>
+          <a:scene3d>
+            <a:camera prst="isometricOffAxis1Top"/>
+            <a:lightRig rig="threePt" dir="t"/>
+          </a:scene3d>
+        </p:spPr>
+        <p:style>
+          <a:lnRef idx="0">
+            <a:schemeClr val="accent1"/>
+          </a:lnRef>
+          <a:fillRef idx="3">
+            <a:schemeClr val="accent1"/>
+          </a:fillRef>
+          <a:effectRef idx="3">
+            <a:schemeClr val="accent1"/>
+          </a:effectRef>
+          <a:fontRef idx="minor">
+            <a:schemeClr val="lt1"/>
+          </a:fontRef>
+        </p:style>
+        <p:txBody>
+          <a:bodyPr rtlCol="0" anchor="ctr"/>
+          <a:lstStyle/>
+          <a:p>
+            <a:pPr algn="ctr"/>
+            <a:r>
+              <a:rPr lang="nl-NL" sz="900" b="1" dirty="0">
+                <a:solidFill>
+                  <a:sysClr val="windowText" lastClr="000000"/>
+                </a:solidFill>
+              </a:rPr>
+              <a:t>63</a:t>
+            </a:r>
+          </a:p>
+        </p:txBody>
+      </p:sp>
+      <p:sp>
+        <p:nvSpPr>
+          <p:cNvPr id="76" name="Ovaal 75">
+            <a:extLst>
+              <a:ext uri="{FF2B5EF4-FFF2-40B4-BE49-F238E27FC236}">
+                <a16:creationId xmlns:a16="http://schemas.microsoft.com/office/drawing/2014/main" id="{A94011FC-CA06-35BE-9212-39410D822FCE}"/>
+              </a:ext>
+            </a:extLst>
+          </p:cNvPr>
+          <p:cNvSpPr/>
+          <p:nvPr/>
+        </p:nvSpPr>
+        <p:spPr>
+          <a:xfrm>
+            <a:off x="8194603" y="4340549"/>
+            <a:ext cx="430925" cy="524179"/>
+          </a:xfrm>
+          <a:prstGeom prst="ellipse">
+            <a:avLst/>
+          </a:prstGeom>
+          <a:solidFill>
             <a:schemeClr val="tx1"/>
           </a:solidFill>
           <a:scene3d>
@@ -5788,57 +6546,6 @@
             <a:pPr algn="ctr"/>
             <a:r>
               <a:rPr lang="nl-NL" sz="900" b="1" dirty="0"/>
-              <a:t>63</a:t>
-            </a:r>
-          </a:p>
-        </p:txBody>
-      </p:sp>
-      <p:sp>
-        <p:nvSpPr>
-          <p:cNvPr id="76" name="Ovaal 75">
-            <a:extLst>
-              <a:ext uri="{FF2B5EF4-FFF2-40B4-BE49-F238E27FC236}">
-                <a16:creationId xmlns:a16="http://schemas.microsoft.com/office/drawing/2014/main" id="{A94011FC-CA06-35BE-9212-39410D822FCE}"/>
-              </a:ext>
-            </a:extLst>
-          </p:cNvPr>
-          <p:cNvSpPr/>
-          <p:nvPr/>
-        </p:nvSpPr>
-        <p:spPr>
-          <a:xfrm>
-            <a:off x="8194603" y="4340549"/>
-            <a:ext cx="430925" cy="524179"/>
-          </a:xfrm>
-          <a:prstGeom prst="ellipse">
-            <a:avLst/>
-          </a:prstGeom>
-          <a:scene3d>
-            <a:camera prst="isometricOffAxis1Top"/>
-            <a:lightRig rig="threePt" dir="t"/>
-          </a:scene3d>
-        </p:spPr>
-        <p:style>
-          <a:lnRef idx="0">
-            <a:schemeClr val="accent1"/>
-          </a:lnRef>
-          <a:fillRef idx="3">
-            <a:schemeClr val="accent1"/>
-          </a:fillRef>
-          <a:effectRef idx="3">
-            <a:schemeClr val="accent1"/>
-          </a:effectRef>
-          <a:fontRef idx="minor">
-            <a:schemeClr val="lt1"/>
-          </a:fontRef>
-        </p:style>
-        <p:txBody>
-          <a:bodyPr rtlCol="0" anchor="ctr"/>
-          <a:lstStyle/>
-          <a:p>
-            <a:pPr algn="ctr"/>
-            <a:r>
-              <a:rPr lang="nl-NL" sz="900" b="1" dirty="0"/>
               <a:t>13</a:t>
             </a:r>
           </a:p>
@@ -5864,6 +6571,9 @@
           <a:prstGeom prst="ellipse">
             <a:avLst/>
           </a:prstGeom>
+          <a:solidFill>
+            <a:schemeClr val="tx1"/>
+          </a:solidFill>
           <a:scene3d>
             <a:camera prst="isometricOffAxis1Top"/>
             <a:lightRig rig="threePt" dir="t"/>
@@ -6954,6 +7664,9 @@
           <a:prstGeom prst="ellipse">
             <a:avLst/>
           </a:prstGeom>
+          <a:solidFill>
+            <a:schemeClr val="tx1"/>
+          </a:solidFill>
           <a:scene3d>
             <a:camera prst="isometricOffAxis1Top"/>
             <a:lightRig rig="threePt" dir="t"/>
@@ -7212,6 +7925,9 @@
           <a:prstGeom prst="ellipse">
             <a:avLst/>
           </a:prstGeom>
+          <a:solidFill>
+            <a:schemeClr val="tx1"/>
+          </a:solidFill>
           <a:scene3d>
             <a:camera prst="isometricOffAxis1Top"/>
             <a:lightRig rig="threePt" dir="t"/>

</xml_diff>